<commit_message>
One more example completed
</commit_message>
<xml_diff>
--- a/input/images-source/LabExampleE3Business.pptx
+++ b/input/images-source/LabExampleE3Business.pptx
@@ -107,6 +107,11 @@
       </a:defRPr>
     </a:lvl9pPr>
   </p:defaultTextStyle>
+  <p:extLst>
+    <p:ext uri="{EFAFB233-063F-42B5-8137-9DF3F51BA10A}">
+      <p15:sldGuideLst xmlns:p15="http://schemas.microsoft.com/office/powerpoint/2012/main"/>
+    </p:ext>
+  </p:extLst>
 </p:presentation>
 </file>
 
@@ -192,7 +197,7 @@
           <a:p>
             <a:fld id="{6B6B179B-27D0-4009-AD17-2AD44ADDF364}" type="datetimeFigureOut">
               <a:rPr lang="fr-FR" smtClean="0"/>
-              <a:t>11/02/2020</a:t>
+              <a:t>12/02/2020</a:t>
             </a:fld>
             <a:endParaRPr lang="fr-FR"/>
           </a:p>
@@ -690,7 +695,7 @@
           <a:p>
             <a:fld id="{49A38CE4-AACE-4F24-8461-CA2A0F97AD61}" type="datetimeFigureOut">
               <a:rPr lang="fr-FR" smtClean="0"/>
-              <a:t>11/02/2020</a:t>
+              <a:t>12/02/2020</a:t>
             </a:fld>
             <a:endParaRPr lang="fr-FR"/>
           </a:p>
@@ -888,7 +893,7 @@
           <a:p>
             <a:fld id="{49A38CE4-AACE-4F24-8461-CA2A0F97AD61}" type="datetimeFigureOut">
               <a:rPr lang="fr-FR" smtClean="0"/>
-              <a:t>11/02/2020</a:t>
+              <a:t>12/02/2020</a:t>
             </a:fld>
             <a:endParaRPr lang="fr-FR"/>
           </a:p>
@@ -1096,7 +1101,7 @@
           <a:p>
             <a:fld id="{49A38CE4-AACE-4F24-8461-CA2A0F97AD61}" type="datetimeFigureOut">
               <a:rPr lang="fr-FR" smtClean="0"/>
-              <a:t>11/02/2020</a:t>
+              <a:t>12/02/2020</a:t>
             </a:fld>
             <a:endParaRPr lang="fr-FR"/>
           </a:p>
@@ -1294,7 +1299,7 @@
           <a:p>
             <a:fld id="{49A38CE4-AACE-4F24-8461-CA2A0F97AD61}" type="datetimeFigureOut">
               <a:rPr lang="fr-FR" smtClean="0"/>
-              <a:t>11/02/2020</a:t>
+              <a:t>12/02/2020</a:t>
             </a:fld>
             <a:endParaRPr lang="fr-FR"/>
           </a:p>
@@ -1569,7 +1574,7 @@
           <a:p>
             <a:fld id="{49A38CE4-AACE-4F24-8461-CA2A0F97AD61}" type="datetimeFigureOut">
               <a:rPr lang="fr-FR" smtClean="0"/>
-              <a:t>11/02/2020</a:t>
+              <a:t>12/02/2020</a:t>
             </a:fld>
             <a:endParaRPr lang="fr-FR"/>
           </a:p>
@@ -1834,7 +1839,7 @@
           <a:p>
             <a:fld id="{49A38CE4-AACE-4F24-8461-CA2A0F97AD61}" type="datetimeFigureOut">
               <a:rPr lang="fr-FR" smtClean="0"/>
-              <a:t>11/02/2020</a:t>
+              <a:t>12/02/2020</a:t>
             </a:fld>
             <a:endParaRPr lang="fr-FR"/>
           </a:p>
@@ -2246,7 +2251,7 @@
           <a:p>
             <a:fld id="{49A38CE4-AACE-4F24-8461-CA2A0F97AD61}" type="datetimeFigureOut">
               <a:rPr lang="fr-FR" smtClean="0"/>
-              <a:t>11/02/2020</a:t>
+              <a:t>12/02/2020</a:t>
             </a:fld>
             <a:endParaRPr lang="fr-FR"/>
           </a:p>
@@ -2387,7 +2392,7 @@
           <a:p>
             <a:fld id="{49A38CE4-AACE-4F24-8461-CA2A0F97AD61}" type="datetimeFigureOut">
               <a:rPr lang="fr-FR" smtClean="0"/>
-              <a:t>11/02/2020</a:t>
+              <a:t>12/02/2020</a:t>
             </a:fld>
             <a:endParaRPr lang="fr-FR"/>
           </a:p>
@@ -2500,7 +2505,7 @@
           <a:p>
             <a:fld id="{49A38CE4-AACE-4F24-8461-CA2A0F97AD61}" type="datetimeFigureOut">
               <a:rPr lang="fr-FR" smtClean="0"/>
-              <a:t>11/02/2020</a:t>
+              <a:t>12/02/2020</a:t>
             </a:fld>
             <a:endParaRPr lang="fr-FR"/>
           </a:p>
@@ -2811,7 +2816,7 @@
           <a:p>
             <a:fld id="{49A38CE4-AACE-4F24-8461-CA2A0F97AD61}" type="datetimeFigureOut">
               <a:rPr lang="fr-FR" smtClean="0"/>
-              <a:t>11/02/2020</a:t>
+              <a:t>12/02/2020</a:t>
             </a:fld>
             <a:endParaRPr lang="fr-FR"/>
           </a:p>
@@ -3099,7 +3104,7 @@
           <a:p>
             <a:fld id="{49A38CE4-AACE-4F24-8461-CA2A0F97AD61}" type="datetimeFigureOut">
               <a:rPr lang="fr-FR" smtClean="0"/>
-              <a:t>11/02/2020</a:t>
+              <a:t>12/02/2020</a:t>
             </a:fld>
             <a:endParaRPr lang="fr-FR"/>
           </a:p>
@@ -3340,7 +3345,7 @@
           <a:p>
             <a:fld id="{49A38CE4-AACE-4F24-8461-CA2A0F97AD61}" type="datetimeFigureOut">
               <a:rPr lang="fr-FR" smtClean="0"/>
-              <a:t>11/02/2020</a:t>
+              <a:t>12/02/2020</a:t>
             </a:fld>
             <a:endParaRPr lang="fr-FR"/>
           </a:p>
@@ -4516,7 +4521,7 @@
             <a:pPr algn="l"/>
             <a:r>
               <a:rPr lang="en-US" sz="3200" dirty="0"/>
-              <a:t>Example E3: creatinine on 24h urine panel, non-orderable</a:t>
+              <a:t>Example E3: creatinine on 24h urine panel, orderable</a:t>
             </a:r>
           </a:p>
         </p:txBody>

</xml_diff>